<commit_message>
added my words for presentation
</commit_message>
<xml_diff>
--- a/Team Project Presentation Slides.pptx
+++ b/Team Project Presentation Slides.pptx
@@ -222,7 +222,7 @@
           <a:p>
             <a:fld id="{FD9D2DDA-69D8-473F-A583-B6774B31A77B}" type="datetimeFigureOut">
               <a:rPr lang="en-US"/>
-              <a:t>3/21/2017</a:t>
+              <a:t>3/22/2017</a:t>
             </a:fld>
             <a:endParaRPr/>
           </a:p>
@@ -387,7 +387,7 @@
           <a:p>
             <a:fld id="{A01F6DFB-6833-46E4-B515-70E0D9178056}" type="datetimeFigureOut">
               <a:rPr lang="en-US"/>
-              <a:t>3/21/2017</a:t>
+              <a:t>3/22/2017</a:t>
             </a:fld>
             <a:endParaRPr/>
           </a:p>
@@ -1187,7 +1187,7 @@
           <a:p>
             <a:fld id="{0B277187-C200-495F-A386-621319EADA8F}" type="datetimeFigureOut">
               <a:rPr lang="en-US"/>
-              <a:t>3/21/2017</a:t>
+              <a:t>3/22/2017</a:t>
             </a:fld>
             <a:endParaRPr/>
           </a:p>
@@ -1379,7 +1379,7 @@
           <a:p>
             <a:fld id="{0B277187-C200-495F-A386-621319EADA8F}" type="datetimeFigureOut">
               <a:rPr lang="en-US"/>
-              <a:t>3/21/2017</a:t>
+              <a:t>3/22/2017</a:t>
             </a:fld>
             <a:endParaRPr/>
           </a:p>
@@ -1577,7 +1577,7 @@
           <a:p>
             <a:fld id="{0B277187-C200-495F-A386-621319EADA8F}" type="datetimeFigureOut">
               <a:rPr lang="en-US"/>
-              <a:t>3/21/2017</a:t>
+              <a:t>3/22/2017</a:t>
             </a:fld>
             <a:endParaRPr/>
           </a:p>
@@ -1881,7 +1881,7 @@
           <a:p>
             <a:fld id="{0B277187-C200-495F-A386-621319EADA8F}" type="datetimeFigureOut">
               <a:rPr lang="en-US"/>
-              <a:t>3/21/2017</a:t>
+              <a:t>3/22/2017</a:t>
             </a:fld>
             <a:endParaRPr/>
           </a:p>
@@ -2185,7 +2185,7 @@
           <a:p>
             <a:fld id="{0B277187-C200-495F-A386-621319EADA8F}" type="datetimeFigureOut">
               <a:rPr lang="en-US"/>
-              <a:t>3/21/2017</a:t>
+              <a:t>3/22/2017</a:t>
             </a:fld>
             <a:endParaRPr/>
           </a:p>
@@ -2637,7 +2637,7 @@
           <a:p>
             <a:fld id="{0B277187-C200-495F-A386-621319EADA8F}" type="datetimeFigureOut">
               <a:rPr lang="en-US"/>
-              <a:t>3/21/2017</a:t>
+              <a:t>3/22/2017</a:t>
             </a:fld>
             <a:endParaRPr/>
           </a:p>
@@ -2767,7 +2767,7 @@
           <a:p>
             <a:fld id="{0B277187-C200-495F-A386-621319EADA8F}" type="datetimeFigureOut">
               <a:rPr lang="en-US"/>
-              <a:t>3/21/2017</a:t>
+              <a:t>3/22/2017</a:t>
             </a:fld>
             <a:endParaRPr/>
           </a:p>
@@ -3013,7 +3013,7 @@
           <a:p>
             <a:fld id="{0B277187-C200-495F-A386-621319EADA8F}" type="datetimeFigureOut">
               <a:rPr lang="en-US"/>
-              <a:t>3/21/2017</a:t>
+              <a:t>3/22/2017</a:t>
             </a:fld>
             <a:endParaRPr/>
           </a:p>
@@ -3450,7 +3450,7 @@
           <a:p>
             <a:fld id="{0B277187-C200-495F-A386-621319EADA8F}" type="datetimeFigureOut">
               <a:rPr lang="en-US"/>
-              <a:t>3/21/2017</a:t>
+              <a:t>3/22/2017</a:t>
             </a:fld>
             <a:endParaRPr/>
           </a:p>
@@ -3873,7 +3873,7 @@
           <a:p>
             <a:fld id="{0B277187-C200-495F-A386-621319EADA8F}" type="datetimeFigureOut">
               <a:rPr lang="en-US"/>
-              <a:t>3/21/2017</a:t>
+              <a:t>3/22/2017</a:t>
             </a:fld>
             <a:endParaRPr/>
           </a:p>
@@ -4263,7 +4263,7 @@
             <a:fld id="{0B277187-C200-495F-A386-621319EADA8F}" type="datetimeFigureOut">
               <a:rPr lang="en-US"/>
               <a:pPr/>
-              <a:t>3/21/2017</a:t>
+              <a:t>3/22/2017</a:t>
             </a:fld>
             <a:endParaRPr/>
           </a:p>
@@ -5128,7 +5128,7 @@
         <p:spPr>
           <a:xfrm>
             <a:off x="797239" y="-358033"/>
-            <a:ext cx="9509760" cy="1233424"/>
+            <a:ext cx="10047224" cy="1233424"/>
           </a:xfrm>
         </p:spPr>
         <p:txBody>
@@ -5137,7 +5137,11 @@
           <a:p>
             <a:r>
               <a:rPr lang="en-US" dirty="0" smtClean="0"/>
-              <a:t>Android App idea</a:t>
+              <a:t>Android App </a:t>
+            </a:r>
+            <a:r>
+              <a:rPr lang="en-US" dirty="0" smtClean="0"/>
+              <a:t>idea – “Audio Acoustic Assistant”</a:t>
             </a:r>
             <a:endParaRPr lang="en-US" dirty="0"/>
           </a:p>
@@ -5295,11 +5299,7 @@
             </a:r>
             <a:r>
               <a:rPr lang="en-IE" sz="1000" dirty="0" smtClean="0"/>
-              <a:t>2016</a:t>
-            </a:r>
-            <a:r>
-              <a:rPr lang="en-IE" sz="1000" dirty="0" smtClean="0"/>
-              <a:t>)</a:t>
+              <a:t>2016)</a:t>
             </a:r>
             <a:endParaRPr lang="en-IE" sz="1000" dirty="0"/>
           </a:p>

</xml_diff>